<commit_message>
Pushing Docs to Repo
</commit_message>
<xml_diff>
--- a/RevanTeamProject/SprintPowerPoint/Sprint1.pptx
+++ b/RevanTeamProject/SprintPowerPoint/Sprint1.pptx
@@ -221,7 +221,7 @@
           <a:p>
             <a:fld id="{B56F32FC-4BD9-442A-A8C6-51598C909FE3}" type="datetimeFigureOut">
               <a:rPr lang="en-US" smtClean="0"/>
-              <a:t>2/4/2024</a:t>
+              <a:t>2/5/2024</a:t>
             </a:fld>
             <a:endParaRPr lang="en-US" dirty="0"/>
           </a:p>
@@ -398,7 +398,7 @@
           <a:p>
             <a:fld id="{056371FA-A98D-41E8-93F4-09945841298A}" type="datetimeFigureOut">
               <a:rPr lang="en-US" smtClean="0"/>
-              <a:t>2/4/2024</a:t>
+              <a:t>2/5/2024</a:t>
             </a:fld>
             <a:endParaRPr lang="en-US" dirty="0"/>
           </a:p>
@@ -10468,7 +10468,28 @@
           <a:p>
             <a:r>
               <a:rPr lang="en-US" dirty="0"/>
-              <a:t>At Contoso, we believe in giving 110%. By using our next-generation data architecture, we help organizations virtually manage agile workflows. We thrive because of our market knowledge and great team behind our product. As our CEO says, "Efficiencies will come from proactively transforming how we do business."​</a:t>
+              <a:t>- Add navigation landing page</a:t>
+            </a:r>
+            <a:br>
+              <a:rPr lang="en-US" dirty="0"/>
+            </a:br>
+            <a:r>
+              <a:rPr lang="en-US" dirty="0"/>
+              <a:t>- Registration Form </a:t>
+            </a:r>
+            <a:br>
+              <a:rPr lang="en-US" dirty="0"/>
+            </a:br>
+            <a:r>
+              <a:rPr lang="en-US" dirty="0"/>
+              <a:t>- Reservation Form</a:t>
+            </a:r>
+            <a:br>
+              <a:rPr lang="en-US" dirty="0"/>
+            </a:br>
+            <a:r>
+              <a:rPr lang="en-US" dirty="0"/>
+              <a:t>- Communication form</a:t>
             </a:r>
           </a:p>
         </p:txBody>
@@ -11477,15 +11498,6 @@
 </file>
 
 <file path=customXml/item1.xml><?xml version="1.0" encoding="utf-8"?>
-<?mso-contentType ?>
-<FormTemplates xmlns="http://schemas.microsoft.com/sharepoint/v3/contenttype/forms">
-  <Display>DocumentLibraryForm</Display>
-  <Edit>DocumentLibraryForm</Edit>
-  <New>DocumentLibraryForm</New>
-</FormTemplates>
-</file>
-
-<file path=customXml/item2.xml><?xml version="1.0" encoding="utf-8"?>
 <p:properties xmlns:p="http://schemas.microsoft.com/office/2006/metadata/properties" xmlns:xsi="http://www.w3.org/2001/XMLSchema-instance" xmlns:pc="http://schemas.microsoft.com/office/infopath/2007/PartnerControls">
   <documentManagement>
     <_ip_UnifiedCompliancePolicyUIAction xmlns="http://schemas.microsoft.com/sharepoint/v3" xsi:nil="true"/>
@@ -11503,6 +11515,15 @@
     <Background xmlns="71af3243-3dd4-4a8d-8c0d-dd76da1f02a5">false</Background>
   </documentManagement>
 </p:properties>
+</file>
+
+<file path=customXml/item2.xml><?xml version="1.0" encoding="utf-8"?>
+<?mso-contentType ?>
+<FormTemplates xmlns="http://schemas.microsoft.com/sharepoint/v3/contenttype/forms">
+  <Display>DocumentLibraryForm</Display>
+  <Edit>DocumentLibraryForm</Edit>
+  <New>DocumentLibraryForm</New>
+</FormTemplates>
 </file>
 
 <file path=customXml/item3.xml><?xml version="1.0" encoding="utf-8"?>
@@ -11818,14 +11839,6 @@
 </file>
 
 <file path=customXml/itemProps1.xml><?xml version="1.0" encoding="utf-8"?>
-<ds:datastoreItem xmlns:ds="http://schemas.openxmlformats.org/officeDocument/2006/customXml" ds:itemID="{BD5826B4-4DD2-4A9B-8D6D-E91CF9C2316C}">
-  <ds:schemaRefs>
-    <ds:schemaRef ds:uri="http://schemas.microsoft.com/sharepoint/v3/contenttype/forms"/>
-  </ds:schemaRefs>
-</ds:datastoreItem>
-</file>
-
-<file path=customXml/itemProps2.xml><?xml version="1.0" encoding="utf-8"?>
 <ds:datastoreItem xmlns:ds="http://schemas.openxmlformats.org/officeDocument/2006/customXml" ds:itemID="{4CC7F809-A434-4A8D-A127-1C50C2DB3890}">
   <ds:schemaRefs>
     <ds:schemaRef ds:uri="http://schemas.microsoft.com/office/2006/metadata/properties"/>
@@ -11833,6 +11846,14 @@
     <ds:schemaRef ds:uri="http://schemas.microsoft.com/sharepoint/v3"/>
     <ds:schemaRef ds:uri="71af3243-3dd4-4a8d-8c0d-dd76da1f02a5"/>
     <ds:schemaRef ds:uri="230e9df3-be65-4c73-a93b-d1236ebd677e"/>
+  </ds:schemaRefs>
+</ds:datastoreItem>
+</file>
+
+<file path=customXml/itemProps2.xml><?xml version="1.0" encoding="utf-8"?>
+<ds:datastoreItem xmlns:ds="http://schemas.openxmlformats.org/officeDocument/2006/customXml" ds:itemID="{BD5826B4-4DD2-4A9B-8D6D-E91CF9C2316C}">
+  <ds:schemaRefs>
+    <ds:schemaRef ds:uri="http://schemas.microsoft.com/sharepoint/v3/contenttype/forms"/>
   </ds:schemaRefs>
 </ds:datastoreItem>
 </file>

</xml_diff>